<commit_message>
Minor fixes on logout
</commit_message>
<xml_diff>
--- a/backend/src/output.pptx
+++ b/backend/src/output.pptx
@@ -110,7 +110,7 @@
 </p:presentation>
 </file>
 
-<file path=ppt/charts/chart5.xml><?xml version="1.0" encoding="utf-8"?>
+<file path=ppt/charts/chart1.xml><?xml version="1.0" encoding="utf-8"?>
 <c:chartSpace xmlns:c="http://schemas.openxmlformats.org/drawingml/2006/chart" xmlns:a="http://schemas.openxmlformats.org/drawingml/2006/main" xmlns:r="http://schemas.openxmlformats.org/officeDocument/2006/relationships">
   <c:date1904 val="0"/>
   <c:roundedCorners val="1"/>
@@ -575,7 +575,7 @@
 </c:chartSpace>
 </file>
 
-<file path=ppt/charts/chart6.xml><?xml version="1.0" encoding="utf-8"?>
+<file path=ppt/charts/chart2.xml><?xml version="1.0" encoding="utf-8"?>
 <c:chartSpace xmlns:c="http://schemas.openxmlformats.org/drawingml/2006/chart" xmlns:a="http://schemas.openxmlformats.org/drawingml/2006/main" xmlns:r="http://schemas.openxmlformats.org/officeDocument/2006/relationships">
   <c:date1904 val="0"/>
   <c:roundedCorners val="1"/>
@@ -2097,7 +2097,7 @@
                   <a:srgbClr val="FFFFFF"/>
                 </a:solidFill>
               </a:rPr>
-              <a:t>Happy coding for this new year</a:t>
+              <a:t>Lorem Ipsum is simply dummy text of the printing and typesetting industry. Lorem Ipsum has been the industry's standard dummy</a:t>
             </a:r>
             <a:endParaRPr lang="en-US" sz="3600" dirty="0"/>
           </a:p>
@@ -2160,7 +2160,7 @@
                   <a:srgbClr val="FFFFFF"/>
                 </a:solidFill>
               </a:rPr>
-              <a:t>Happy coding for this new year</a:t>
+              <a:t>Lorem Ipsum is simply dummy text of the printing and typesetting industry. Lorem Ipsum has been the industry's standard dummy</a:t>
             </a:r>
             <a:endParaRPr lang="en-US" sz="3600" dirty="0"/>
           </a:p>

</xml_diff>